<commit_message>
added (empty) files that make the structure of the course
</commit_message>
<xml_diff>
--- a/content/resources/2-clean code/Clean-code.pptx
+++ b/content/resources/2-clean code/Clean-code.pptx
@@ -11,6 +11,9 @@
     <p:sldId id="259" r:id="rId5"/>
     <p:sldId id="260" r:id="rId6"/>
     <p:sldId id="261" r:id="rId7"/>
+    <p:sldId id="262" r:id="rId8"/>
+    <p:sldId id="263" r:id="rId9"/>
+    <p:sldId id="264" r:id="rId10"/>
   </p:sldIdLst>
   <p:sldSz cx="12192000" cy="6858000"/>
   <p:notesSz cx="6858000" cy="9144000"/>
@@ -109,6 +112,11 @@
       </a:defRPr>
     </a:lvl9pPr>
   </p:defaultTextStyle>
+  <p:extLst>
+    <p:ext uri="{EFAFB233-063F-42B5-8137-9DF3F51BA10A}">
+      <p15:sldGuideLst xmlns:p15="http://schemas.microsoft.com/office/powerpoint/2012/main"/>
+    </p:ext>
+  </p:extLst>
 </p:presentation>
 </file>
 
@@ -261,7 +269,7 @@
           <a:p>
             <a:fld id="{1F3D7F03-4E26-481F-BF7A-0AFA9749C262}" type="datetimeFigureOut">
               <a:rPr lang="en-GB" smtClean="0"/>
-              <a:t>01/04/2022</a:t>
+              <a:t>12/07/2022</a:t>
             </a:fld>
             <a:endParaRPr lang="en-GB"/>
           </a:p>
@@ -461,7 +469,7 @@
           <a:p>
             <a:fld id="{1F3D7F03-4E26-481F-BF7A-0AFA9749C262}" type="datetimeFigureOut">
               <a:rPr lang="en-GB" smtClean="0"/>
-              <a:t>01/04/2022</a:t>
+              <a:t>12/07/2022</a:t>
             </a:fld>
             <a:endParaRPr lang="en-GB"/>
           </a:p>
@@ -671,7 +679,7 @@
           <a:p>
             <a:fld id="{1F3D7F03-4E26-481F-BF7A-0AFA9749C262}" type="datetimeFigureOut">
               <a:rPr lang="en-GB" smtClean="0"/>
-              <a:t>01/04/2022</a:t>
+              <a:t>12/07/2022</a:t>
             </a:fld>
             <a:endParaRPr lang="en-GB"/>
           </a:p>
@@ -871,7 +879,7 @@
           <a:p>
             <a:fld id="{1F3D7F03-4E26-481F-BF7A-0AFA9749C262}" type="datetimeFigureOut">
               <a:rPr lang="en-GB" smtClean="0"/>
-              <a:t>01/04/2022</a:t>
+              <a:t>12/07/2022</a:t>
             </a:fld>
             <a:endParaRPr lang="en-GB"/>
           </a:p>
@@ -1147,7 +1155,7 @@
           <a:p>
             <a:fld id="{1F3D7F03-4E26-481F-BF7A-0AFA9749C262}" type="datetimeFigureOut">
               <a:rPr lang="en-GB" smtClean="0"/>
-              <a:t>01/04/2022</a:t>
+              <a:t>12/07/2022</a:t>
             </a:fld>
             <a:endParaRPr lang="en-GB"/>
           </a:p>
@@ -1415,7 +1423,7 @@
           <a:p>
             <a:fld id="{1F3D7F03-4E26-481F-BF7A-0AFA9749C262}" type="datetimeFigureOut">
               <a:rPr lang="en-GB" smtClean="0"/>
-              <a:t>01/04/2022</a:t>
+              <a:t>12/07/2022</a:t>
             </a:fld>
             <a:endParaRPr lang="en-GB"/>
           </a:p>
@@ -1830,7 +1838,7 @@
           <a:p>
             <a:fld id="{1F3D7F03-4E26-481F-BF7A-0AFA9749C262}" type="datetimeFigureOut">
               <a:rPr lang="en-GB" smtClean="0"/>
-              <a:t>01/04/2022</a:t>
+              <a:t>12/07/2022</a:t>
             </a:fld>
             <a:endParaRPr lang="en-GB"/>
           </a:p>
@@ -1972,7 +1980,7 @@
           <a:p>
             <a:fld id="{1F3D7F03-4E26-481F-BF7A-0AFA9749C262}" type="datetimeFigureOut">
               <a:rPr lang="en-GB" smtClean="0"/>
-              <a:t>01/04/2022</a:t>
+              <a:t>12/07/2022</a:t>
             </a:fld>
             <a:endParaRPr lang="en-GB"/>
           </a:p>
@@ -2085,7 +2093,7 @@
           <a:p>
             <a:fld id="{1F3D7F03-4E26-481F-BF7A-0AFA9749C262}" type="datetimeFigureOut">
               <a:rPr lang="en-GB" smtClean="0"/>
-              <a:t>01/04/2022</a:t>
+              <a:t>12/07/2022</a:t>
             </a:fld>
             <a:endParaRPr lang="en-GB"/>
           </a:p>
@@ -2398,7 +2406,7 @@
           <a:p>
             <a:fld id="{1F3D7F03-4E26-481F-BF7A-0AFA9749C262}" type="datetimeFigureOut">
               <a:rPr lang="en-GB" smtClean="0"/>
-              <a:t>01/04/2022</a:t>
+              <a:t>12/07/2022</a:t>
             </a:fld>
             <a:endParaRPr lang="en-GB"/>
           </a:p>
@@ -2687,7 +2695,7 @@
           <a:p>
             <a:fld id="{1F3D7F03-4E26-481F-BF7A-0AFA9749C262}" type="datetimeFigureOut">
               <a:rPr lang="en-GB" smtClean="0"/>
-              <a:t>01/04/2022</a:t>
+              <a:t>12/07/2022</a:t>
             </a:fld>
             <a:endParaRPr lang="en-GB"/>
           </a:p>
@@ -2930,7 +2938,7 @@
           <a:p>
             <a:fld id="{1F3D7F03-4E26-481F-BF7A-0AFA9749C262}" type="datetimeFigureOut">
               <a:rPr lang="en-GB" smtClean="0"/>
-              <a:t>01/04/2022</a:t>
+              <a:t>12/07/2022</a:t>
             </a:fld>
             <a:endParaRPr lang="en-GB"/>
           </a:p>
@@ -3603,7 +3611,11 @@
           <a:bodyPr/>
           <a:lstStyle/>
           <a:p>
-            <a:endParaRPr lang="en-GB"/>
+            <a:r>
+              <a:rPr lang="en-US" i="1" dirty="0"/>
+              <a:t>Clean code is code that is easy to understand and easy to change.</a:t>
+            </a:r>
+            <a:endParaRPr lang="en-GB" dirty="0"/>
           </a:p>
         </p:txBody>
       </p:sp>
@@ -3683,7 +3695,19 @@
           <a:bodyPr/>
           <a:lstStyle/>
           <a:p>
-            <a:endParaRPr lang="en-GB"/>
+            <a:r>
+              <a:rPr lang="en-US" dirty="0"/>
+              <a:t>"Any fool can write</a:t>
+            </a:r>
+            <a:r>
+              <a:rPr lang="en-US" b="1" dirty="0"/>
+              <a:t> </a:t>
+            </a:r>
+            <a:r>
+              <a:rPr lang="en-US" dirty="0"/>
+              <a:t>code that a computer can understand. Good programmers write code that humans can understand."                                       – Martin Fowler</a:t>
+            </a:r>
+            <a:endParaRPr lang="en-GB" dirty="0"/>
           </a:p>
         </p:txBody>
       </p:sp>
@@ -3767,6 +3791,47 @@
           </a:p>
         </p:txBody>
       </p:sp>
+      <p:pic>
+        <p:nvPicPr>
+          <p:cNvPr id="4" name="Picture 2" descr="Clean Code Explained – A Practical Introduction to Clean Coding for Beginners"/>
+          <p:cNvPicPr>
+            <a:picLocks noChangeAspect="1" noChangeArrowheads="1"/>
+          </p:cNvPicPr>
+          <p:nvPr/>
+        </p:nvPicPr>
+        <p:blipFill>
+          <a:blip r:embed="rId2">
+            <a:extLst>
+              <a:ext uri="{28A0092B-C50C-407E-A947-70E740481C1C}">
+                <a14:useLocalDpi xmlns:a14="http://schemas.microsoft.com/office/drawing/2010/main" val="0"/>
+              </a:ext>
+            </a:extLst>
+          </a:blip>
+          <a:srcRect/>
+          <a:stretch>
+            <a:fillRect/>
+          </a:stretch>
+        </p:blipFill>
+        <p:spPr bwMode="auto">
+          <a:xfrm>
+            <a:off x="2309838" y="903919"/>
+            <a:ext cx="6540371" cy="5149057"/>
+          </a:xfrm>
+          <a:prstGeom prst="rect">
+            <a:avLst/>
+          </a:prstGeom>
+          <a:noFill/>
+          <a:extLst>
+            <a:ext uri="{909E8E84-426E-40DD-AFC4-6F175D3DCCD1}">
+              <a14:hiddenFill xmlns:a14="http://schemas.microsoft.com/office/drawing/2010/main">
+                <a:solidFill>
+                  <a:srgbClr val="FFFFFF"/>
+                </a:solidFill>
+              </a14:hiddenFill>
+            </a:ext>
+          </a:extLst>
+        </p:spPr>
+      </p:pic>
     </p:spTree>
     <p:extLst>
       <p:ext uri="{BB962C8B-B14F-4D97-AF65-F5344CB8AC3E}">
@@ -3818,7 +3883,15 @@
           <a:bodyPr/>
           <a:lstStyle/>
           <a:p>
-            <a:endParaRPr lang="en-GB"/>
+            <a:r>
+              <a:rPr lang="en-US" b="1" dirty="0"/>
+              <a:t>How to Name Variables (and other things</a:t>
+            </a:r>
+            <a:r>
+              <a:rPr lang="en-US" b="1" dirty="0" smtClean="0"/>
+              <a:t>)</a:t>
+            </a:r>
+            <a:endParaRPr lang="en-GB" dirty="0"/>
           </a:p>
         </p:txBody>
       </p:sp>
@@ -3843,7 +3916,15 @@
           <a:bodyPr/>
           <a:lstStyle/>
           <a:p>
-            <a:endParaRPr lang="en-GB"/>
+            <a:r>
+              <a:rPr lang="en-US" dirty="0"/>
+              <a:t>"There are only two hard things in Computer Science: cache invalidation and naming things."                                                                                                                – Phil </a:t>
+            </a:r>
+            <a:r>
+              <a:rPr lang="en-US" dirty="0" err="1"/>
+              <a:t>Karlton</a:t>
+            </a:r>
+            <a:endParaRPr lang="en-GB" dirty="0"/>
           </a:p>
         </p:txBody>
       </p:sp>
@@ -3851,6 +3932,277 @@
     <p:extLst>
       <p:ext uri="{BB962C8B-B14F-4D97-AF65-F5344CB8AC3E}">
         <p14:creationId xmlns:p14="http://schemas.microsoft.com/office/powerpoint/2010/main" val="1236136695"/>
+      </p:ext>
+    </p:extLst>
+  </p:cSld>
+  <p:clrMapOvr>
+    <a:masterClrMapping/>
+  </p:clrMapOvr>
+</p:sld>
+</file>
+
+<file path=ppt/slides/slide7.xml><?xml version="1.0" encoding="utf-8"?>
+<p:sld xmlns:a="http://schemas.openxmlformats.org/drawingml/2006/main" xmlns:r="http://schemas.openxmlformats.org/officeDocument/2006/relationships" xmlns:p="http://schemas.openxmlformats.org/presentationml/2006/main">
+  <p:cSld>
+    <p:spTree>
+      <p:nvGrpSpPr>
+        <p:cNvPr id="1" name=""/>
+        <p:cNvGrpSpPr/>
+        <p:nvPr/>
+      </p:nvGrpSpPr>
+      <p:grpSpPr>
+        <a:xfrm>
+          <a:off x="0" y="0"/>
+          <a:ext cx="0" cy="0"/>
+          <a:chOff x="0" y="0"/>
+          <a:chExt cx="0" cy="0"/>
+        </a:xfrm>
+      </p:grpSpPr>
+      <p:sp>
+        <p:nvSpPr>
+          <p:cNvPr id="2" name="Title 1"/>
+          <p:cNvSpPr>
+            <a:spLocks noGrp="1"/>
+          </p:cNvSpPr>
+          <p:nvPr>
+            <p:ph type="title"/>
+          </p:nvPr>
+        </p:nvSpPr>
+        <p:spPr/>
+        <p:txBody>
+          <a:bodyPr/>
+          <a:lstStyle/>
+          <a:p>
+            <a:r>
+              <a:rPr lang="en-GB" b="1" dirty="0"/>
+              <a:t>Avoid Noise </a:t>
+            </a:r>
+            <a:r>
+              <a:rPr lang="en-GB" b="1" dirty="0" smtClean="0"/>
+              <a:t>Words</a:t>
+            </a:r>
+            <a:endParaRPr lang="en-GB" dirty="0"/>
+          </a:p>
+        </p:txBody>
+      </p:sp>
+      <p:sp>
+        <p:nvSpPr>
+          <p:cNvPr id="3" name="Content Placeholder 2"/>
+          <p:cNvSpPr>
+            <a:spLocks noGrp="1"/>
+          </p:cNvSpPr>
+          <p:nvPr>
+            <p:ph idx="1"/>
+          </p:nvPr>
+        </p:nvSpPr>
+        <p:spPr/>
+        <p:txBody>
+          <a:bodyPr/>
+          <a:lstStyle/>
+          <a:p>
+            <a:pPr fontAlgn="base"/>
+            <a:r>
+              <a:rPr lang="en-US" dirty="0"/>
+              <a:t>The (prefix)</a:t>
+            </a:r>
+          </a:p>
+          <a:p>
+            <a:pPr fontAlgn="base"/>
+            <a:r>
+              <a:rPr lang="en-US" dirty="0"/>
+              <a:t>Info</a:t>
+            </a:r>
+          </a:p>
+          <a:p>
+            <a:pPr fontAlgn="base"/>
+            <a:r>
+              <a:rPr lang="en-US" dirty="0"/>
+              <a:t>Data</a:t>
+            </a:r>
+          </a:p>
+          <a:p>
+            <a:pPr fontAlgn="base"/>
+            <a:r>
+              <a:rPr lang="en-US" dirty="0"/>
+              <a:t>Variable</a:t>
+            </a:r>
+          </a:p>
+          <a:p>
+            <a:pPr fontAlgn="base"/>
+            <a:r>
+              <a:rPr lang="en-US" dirty="0"/>
+              <a:t>Object</a:t>
+            </a:r>
+          </a:p>
+          <a:p>
+            <a:pPr fontAlgn="base"/>
+            <a:r>
+              <a:rPr lang="en-US" dirty="0"/>
+              <a:t>Manager</a:t>
+            </a:r>
+          </a:p>
+          <a:p>
+            <a:pPr marL="0" indent="0">
+              <a:buNone/>
+            </a:pPr>
+            <a:endParaRPr lang="en-GB" dirty="0"/>
+          </a:p>
+        </p:txBody>
+      </p:sp>
+    </p:spTree>
+    <p:extLst>
+      <p:ext uri="{BB962C8B-B14F-4D97-AF65-F5344CB8AC3E}">
+        <p14:creationId xmlns:p14="http://schemas.microsoft.com/office/powerpoint/2010/main" val="501130660"/>
+      </p:ext>
+    </p:extLst>
+  </p:cSld>
+  <p:clrMapOvr>
+    <a:masterClrMapping/>
+  </p:clrMapOvr>
+</p:sld>
+</file>
+
+<file path=ppt/slides/slide8.xml><?xml version="1.0" encoding="utf-8"?>
+<p:sld xmlns:a="http://schemas.openxmlformats.org/drawingml/2006/main" xmlns:r="http://schemas.openxmlformats.org/officeDocument/2006/relationships" xmlns:p="http://schemas.openxmlformats.org/presentationml/2006/main">
+  <p:cSld>
+    <p:spTree>
+      <p:nvGrpSpPr>
+        <p:cNvPr id="1" name=""/>
+        <p:cNvGrpSpPr/>
+        <p:nvPr/>
+      </p:nvGrpSpPr>
+      <p:grpSpPr>
+        <a:xfrm>
+          <a:off x="0" y="0"/>
+          <a:ext cx="0" cy="0"/>
+          <a:chOff x="0" y="0"/>
+          <a:chExt cx="0" cy="0"/>
+        </a:xfrm>
+      </p:grpSpPr>
+      <p:sp>
+        <p:nvSpPr>
+          <p:cNvPr id="2" name="Title 1"/>
+          <p:cNvSpPr>
+            <a:spLocks noGrp="1"/>
+          </p:cNvSpPr>
+          <p:nvPr>
+            <p:ph type="title"/>
+          </p:nvPr>
+        </p:nvSpPr>
+        <p:spPr/>
+        <p:txBody>
+          <a:bodyPr/>
+          <a:lstStyle/>
+          <a:p>
+            <a:r>
+              <a:rPr lang="en-GB" b="1" dirty="0"/>
+              <a:t>Use Pronounceable </a:t>
+            </a:r>
+            <a:r>
+              <a:rPr lang="en-GB" b="1" dirty="0" smtClean="0"/>
+              <a:t>Names</a:t>
+            </a:r>
+            <a:endParaRPr lang="en-GB" dirty="0"/>
+          </a:p>
+        </p:txBody>
+      </p:sp>
+      <p:sp>
+        <p:nvSpPr>
+          <p:cNvPr id="3" name="Content Placeholder 2"/>
+          <p:cNvSpPr>
+            <a:spLocks noGrp="1"/>
+          </p:cNvSpPr>
+          <p:nvPr>
+            <p:ph idx="1"/>
+          </p:nvPr>
+        </p:nvSpPr>
+        <p:spPr/>
+        <p:txBody>
+          <a:bodyPr/>
+          <a:lstStyle/>
+          <a:p>
+            <a:r>
+              <a:rPr lang="en-GB" b="1"/>
+              <a:t>Be Consistent</a:t>
+            </a:r>
+          </a:p>
+          <a:p>
+            <a:endParaRPr lang="en-GB"/>
+          </a:p>
+        </p:txBody>
+      </p:sp>
+    </p:spTree>
+    <p:extLst>
+      <p:ext uri="{BB962C8B-B14F-4D97-AF65-F5344CB8AC3E}">
+        <p14:creationId xmlns:p14="http://schemas.microsoft.com/office/powerpoint/2010/main" val="3678144631"/>
+      </p:ext>
+    </p:extLst>
+  </p:cSld>
+  <p:clrMapOvr>
+    <a:masterClrMapping/>
+  </p:clrMapOvr>
+</p:sld>
+</file>
+
+<file path=ppt/slides/slide9.xml><?xml version="1.0" encoding="utf-8"?>
+<p:sld xmlns:a="http://schemas.openxmlformats.org/drawingml/2006/main" xmlns:r="http://schemas.openxmlformats.org/officeDocument/2006/relationships" xmlns:p="http://schemas.openxmlformats.org/presentationml/2006/main">
+  <p:cSld>
+    <p:spTree>
+      <p:nvGrpSpPr>
+        <p:cNvPr id="1" name=""/>
+        <p:cNvGrpSpPr/>
+        <p:nvPr/>
+      </p:nvGrpSpPr>
+      <p:grpSpPr>
+        <a:xfrm>
+          <a:off x="0" y="0"/>
+          <a:ext cx="0" cy="0"/>
+          <a:chOff x="0" y="0"/>
+          <a:chExt cx="0" cy="0"/>
+        </a:xfrm>
+      </p:grpSpPr>
+      <p:sp>
+        <p:nvSpPr>
+          <p:cNvPr id="2" name="Title 1"/>
+          <p:cNvSpPr>
+            <a:spLocks noGrp="1"/>
+          </p:cNvSpPr>
+          <p:nvPr>
+            <p:ph type="title"/>
+          </p:nvPr>
+        </p:nvSpPr>
+        <p:spPr/>
+        <p:txBody>
+          <a:bodyPr/>
+          <a:lstStyle/>
+          <a:p>
+            <a:endParaRPr lang="en-GB"/>
+          </a:p>
+        </p:txBody>
+      </p:sp>
+      <p:sp>
+        <p:nvSpPr>
+          <p:cNvPr id="3" name="Content Placeholder 2"/>
+          <p:cNvSpPr>
+            <a:spLocks noGrp="1"/>
+          </p:cNvSpPr>
+          <p:nvPr>
+            <p:ph idx="1"/>
+          </p:nvPr>
+        </p:nvSpPr>
+        <p:spPr/>
+        <p:txBody>
+          <a:bodyPr/>
+          <a:lstStyle/>
+          <a:p>
+            <a:endParaRPr lang="en-GB"/>
+          </a:p>
+        </p:txBody>
+      </p:sp>
+    </p:spTree>
+    <p:extLst>
+      <p:ext uri="{BB962C8B-B14F-4D97-AF65-F5344CB8AC3E}">
+        <p14:creationId xmlns:p14="http://schemas.microsoft.com/office/powerpoint/2010/main" val="2312020251"/>
       </p:ext>
     </p:extLst>
   </p:cSld>

</xml_diff>